<commit_message>
sua git cap nhat lai pptx xoa rm cua zhang
</commit_message>
<xml_diff>
--- a/Báo cáo Final.pptx
+++ b/Báo cáo Final.pptx
@@ -420,7 +420,7 @@
           <a:p>
             <a:fld id="{AE70FEDE-5384-4AAC-BC2F-15E717367EFE}" type="datetimeFigureOut">
               <a:rPr lang="en-US" smtClean="0"/>
-              <a:t>5/14/2025</a:t>
+              <a:t>5/15/2025</a:t>
             </a:fld>
             <a:endParaRPr lang="en-US"/>
           </a:p>
@@ -7879,11 +7879,7 @@
             </a:r>
             <a:r>
               <a:rPr lang="en-US" sz="2000" b="1" dirty="0" smtClean="0"/>
-              <a:t> T(</a:t>
-            </a:r>
-            <a:r>
-              <a:rPr lang="en-US" sz="2000" b="1" dirty="0" smtClean="0"/>
-              <a:t>temperature</a:t>
+              <a:t> T(temperature</a:t>
             </a:r>
             <a:r>
               <a:rPr lang="en-US" sz="2000" dirty="0" smtClean="0"/>
@@ -8264,7 +8260,11 @@
           <a:p>
             <a:r>
               <a:rPr lang="en" sz="4800" b="1" dirty="0" smtClean="0"/>
-              <a:t>Phương pháp</a:t>
+              <a:t>Phương </a:t>
+            </a:r>
+            <a:r>
+              <a:rPr lang="en" sz="4800" b="1" dirty="0" smtClean="0"/>
+              <a:t>pháp tiếp cận</a:t>
             </a:r>
             <a:endParaRPr lang="en-US" sz="4800" dirty="0"/>
           </a:p>
@@ -8353,7 +8353,11 @@
           <a:p>
             <a:r>
               <a:rPr lang="en" sz="4800" b="1" dirty="0" smtClean="0"/>
-              <a:t>Phương pháp</a:t>
+              <a:t>Phương </a:t>
+            </a:r>
+            <a:r>
+              <a:rPr lang="en" sz="4800" b="1" dirty="0" smtClean="0"/>
+              <a:t>pháp tiếp cận</a:t>
             </a:r>
             <a:endParaRPr lang="en-US" sz="4800" dirty="0"/>
           </a:p>
@@ -8747,7 +8751,11 @@
           <a:p>
             <a:r>
               <a:rPr lang="en" sz="4800" b="1" dirty="0" smtClean="0"/>
-              <a:t>Phương pháp</a:t>
+              <a:t>Phương </a:t>
+            </a:r>
+            <a:r>
+              <a:rPr lang="en" sz="4800" b="1" dirty="0" smtClean="0"/>
+              <a:t>pháp tiếp cận</a:t>
             </a:r>
             <a:endParaRPr lang="en-US" sz="4800" dirty="0"/>
           </a:p>
@@ -9821,7 +9829,11 @@
           <a:p>
             <a:r>
               <a:rPr lang="en" sz="4800" b="1" dirty="0" smtClean="0"/>
-              <a:t>Phương pháp</a:t>
+              <a:t>Phương </a:t>
+            </a:r>
+            <a:r>
+              <a:rPr lang="en" sz="4800" b="1" dirty="0" smtClean="0"/>
+              <a:t>pháp tiếp cận</a:t>
             </a:r>
             <a:endParaRPr lang="en-US" sz="4800" b="1" dirty="0"/>
           </a:p>
@@ -14419,8 +14431,8 @@
         </p:nvSpPr>
         <p:spPr>
           <a:xfrm>
-            <a:off x="629200" y="98400"/>
-            <a:ext cx="10962800" cy="894000"/>
+            <a:off x="629199" y="98400"/>
+            <a:ext cx="11382691" cy="894000"/>
           </a:xfrm>
           <a:prstGeom prst="rect">
             <a:avLst/>
@@ -14684,7 +14696,19 @@
           <a:p>
             <a:r>
               <a:rPr lang="en" sz="4800" b="1" kern="0" dirty="0" smtClean="0"/>
-              <a:t>Nội dung và phương pháp</a:t>
+              <a:t>Nội dung </a:t>
+            </a:r>
+            <a:r>
+              <a:rPr lang="en" sz="4800" b="1" kern="0" dirty="0" smtClean="0"/>
+              <a:t>&amp; </a:t>
+            </a:r>
+            <a:r>
+              <a:rPr lang="en" sz="4800" b="1" kern="0" dirty="0" smtClean="0"/>
+              <a:t>phương </a:t>
+            </a:r>
+            <a:r>
+              <a:rPr lang="en" sz="4800" b="1" kern="0" dirty="0" smtClean="0"/>
+              <a:t>pháp nghiên cứu</a:t>
             </a:r>
             <a:endParaRPr lang="en-US" sz="4800" kern="0" dirty="0"/>
           </a:p>
@@ -16128,7 +16152,7 @@
         <p:spPr>
           <a:xfrm>
             <a:off x="629200" y="98400"/>
-            <a:ext cx="10962800" cy="894000"/>
+            <a:ext cx="11562800" cy="894000"/>
           </a:xfrm>
           <a:prstGeom prst="rect">
             <a:avLst/>
@@ -16392,7 +16416,11 @@
           <a:p>
             <a:r>
               <a:rPr lang="en" sz="4800" b="1" kern="0" dirty="0" smtClean="0"/>
-              <a:t>Nội dung và phương pháp</a:t>
+              <a:t>Nội dung </a:t>
+            </a:r>
+            <a:r>
+              <a:rPr lang="en" sz="4800" b="1" kern="0" dirty="0" smtClean="0"/>
+              <a:t>&amp; phương pháp nghiên cứu</a:t>
             </a:r>
             <a:endParaRPr lang="en-US" sz="4800" kern="0" dirty="0"/>
           </a:p>
@@ -19283,7 +19311,7 @@
         <p:spPr>
           <a:xfrm>
             <a:off x="629200" y="98400"/>
-            <a:ext cx="10962800" cy="894000"/>
+            <a:ext cx="11562800" cy="894000"/>
           </a:xfrm>
           <a:prstGeom prst="rect">
             <a:avLst/>
@@ -19547,7 +19575,11 @@
           <a:p>
             <a:r>
               <a:rPr lang="en" sz="4800" b="1" kern="0" dirty="0" smtClean="0"/>
-              <a:t>Nội dung và phương pháp</a:t>
+              <a:t>Nội dung </a:t>
+            </a:r>
+            <a:r>
+              <a:rPr lang="en" sz="4800" b="1" kern="0" dirty="0" smtClean="0"/>
+              <a:t>&amp; phương pháp nghiên cứu</a:t>
             </a:r>
             <a:endParaRPr lang="en-US" sz="4800" kern="0" dirty="0"/>
           </a:p>
@@ -22655,6 +22687,22 @@
               <a:rPr lang="en-US" sz="4800" b="1" dirty="0" err="1" smtClean="0"/>
               <a:t>pháp</a:t>
             </a:r>
+            <a:r>
+              <a:rPr lang="en-US" sz="4800" b="1" dirty="0" smtClean="0"/>
+              <a:t> </a:t>
+            </a:r>
+            <a:r>
+              <a:rPr lang="en-US" sz="4800" b="1" dirty="0" err="1" smtClean="0"/>
+              <a:t>tiếp</a:t>
+            </a:r>
+            <a:r>
+              <a:rPr lang="en-US" sz="4800" b="1" dirty="0" smtClean="0"/>
+              <a:t> </a:t>
+            </a:r>
+            <a:r>
+              <a:rPr lang="en-US" sz="4800" b="1" dirty="0" err="1" smtClean="0"/>
+              <a:t>cận</a:t>
+            </a:r>
             <a:endParaRPr lang="en-US" sz="4800" b="1" dirty="0"/>
           </a:p>
         </p:txBody>
@@ -23077,7 +23125,11 @@
           <a:p>
             <a:r>
               <a:rPr lang="en" sz="4800" b="1" dirty="0" smtClean="0"/>
-              <a:t>Phương pháp</a:t>
+              <a:t>Phương </a:t>
+            </a:r>
+            <a:r>
+              <a:rPr lang="en" sz="4800" b="1" dirty="0" smtClean="0"/>
+              <a:t>pháp tiếp cận</a:t>
             </a:r>
             <a:endParaRPr lang="en-US" sz="4800" dirty="0"/>
           </a:p>
@@ -24586,7 +24638,11 @@
           <a:p>
             <a:r>
               <a:rPr lang="en" sz="4800" b="1" dirty="0" smtClean="0"/>
-              <a:t>Phương pháp</a:t>
+              <a:t>Phương </a:t>
+            </a:r>
+            <a:r>
+              <a:rPr lang="en" sz="4800" b="1" dirty="0" smtClean="0"/>
+              <a:t>pháp tiếp cận</a:t>
             </a:r>
             <a:endParaRPr lang="en-US" sz="4800" dirty="0"/>
           </a:p>
@@ -25019,7 +25075,11 @@
           <a:p>
             <a:r>
               <a:rPr lang="en" sz="4800" b="1" dirty="0" smtClean="0"/>
-              <a:t>Phương pháp</a:t>
+              <a:t>Phương </a:t>
+            </a:r>
+            <a:r>
+              <a:rPr lang="en" sz="4800" b="1" dirty="0" smtClean="0"/>
+              <a:t>pháp tiếp cận</a:t>
             </a:r>
             <a:endParaRPr lang="en-US" sz="4800" dirty="0"/>
           </a:p>
@@ -25385,7 +25445,11 @@
           <a:p>
             <a:r>
               <a:rPr lang="en" sz="4800" b="1" dirty="0" smtClean="0"/>
-              <a:t>Phương pháp</a:t>
+              <a:t>Phương </a:t>
+            </a:r>
+            <a:r>
+              <a:rPr lang="en" sz="4800" b="1" dirty="0" smtClean="0"/>
+              <a:t>pháp tiếp cận</a:t>
             </a:r>
             <a:endParaRPr lang="en-US" sz="4800" b="1" dirty="0"/>
           </a:p>

</xml_diff>